<commit_message>
Update Infinite Synthesis x64 설계.pptx
</commit_message>
<xml_diff>
--- a/0dev/Infinite Synthesis x64 설계.pptx
+++ b/0dev/Infinite Synthesis x64 설계.pptx
@@ -2,7 +2,7 @@
 <file path=ppt/presentation.xml><?xml version="1.0" encoding="utf-8"?>
 <p:presentation xmlns:r="http://schemas.openxmlformats.org/officeDocument/2006/relationships" xmlns:c="http://schemas.openxmlformats.org/drawingml/2006/chart" xmlns:a="http://schemas.openxmlformats.org/drawingml/2006/main" xmlns:dgm="http://schemas.openxmlformats.org/drawingml/2006/diagram" xmlns:dsp="http://schemas.microsoft.com/office/drawing/2008/diagram" xmlns:p="http://schemas.openxmlformats.org/presentationml/2006/main" saveSubsetFonts="1">
   <p:sldMasterIdLst>
-    <p:sldMasterId id="2147483672" r:id="rId4"/>
+    <p:sldMasterId id="2147483660" r:id="rId4"/>
   </p:sldMasterIdLst>
   <p:sldIdLst>
     <p:sldId id="257" r:id="rId1"/>
@@ -2672,7 +2672,7 @@
             <a:fld id="{FB30EDBD-1C2D-4C1E-B459-B60219FAB484}" type="datetimeFigureOut">
               <a:rPr lang="ko-KR" altLang="en-US"/>
               <a:pPr/>
-              <a:t>2019-07-26</a:t>
+              <a:t>2019-08-13</a:t>
             </a:fld>
             <a:endParaRPr lang="ko-KR" altLang="en-US"/>
           </a:p>
@@ -2767,17 +2767,17 @@
   </p:cSld>
   <p:clrMap bg1="lt1" tx1="dk1" bg2="lt2" tx2="dk2" accent1="accent1" accent2="accent2" accent3="accent3" accent4="accent4" accent5="accent5" accent6="accent6" hlink="hlink" folHlink="folHlink"/>
   <p:sldLayoutIdLst>
-    <p:sldLayoutId id="2147483661" r:id="rId2"/>
-    <p:sldLayoutId id="2147483662" r:id="rId3"/>
-    <p:sldLayoutId id="2147483663" r:id="rId4"/>
-    <p:sldLayoutId id="2147483664" r:id="rId5"/>
-    <p:sldLayoutId id="2147483665" r:id="rId6"/>
-    <p:sldLayoutId id="2147483666" r:id="rId7"/>
-    <p:sldLayoutId id="2147483667" r:id="rId8"/>
-    <p:sldLayoutId id="2147483668" r:id="rId9"/>
-    <p:sldLayoutId id="2147483669" r:id="rId10"/>
-    <p:sldLayoutId id="2147483670" r:id="rId11"/>
-    <p:sldLayoutId id="2147483671" r:id="rId12"/>
+    <p:sldLayoutId id="2147483649" r:id="rId2"/>
+    <p:sldLayoutId id="2147483650" r:id="rId3"/>
+    <p:sldLayoutId id="2147483651" r:id="rId4"/>
+    <p:sldLayoutId id="2147483652" r:id="rId5"/>
+    <p:sldLayoutId id="2147483653" r:id="rId6"/>
+    <p:sldLayoutId id="2147483654" r:id="rId7"/>
+    <p:sldLayoutId id="2147483655" r:id="rId8"/>
+    <p:sldLayoutId id="2147483656" r:id="rId9"/>
+    <p:sldLayoutId id="2147483657" r:id="rId10"/>
+    <p:sldLayoutId id="2147483658" r:id="rId11"/>
+    <p:sldLayoutId id="2147483659" r:id="rId12"/>
   </p:sldLayoutIdLst>
   <p:txStyles>
     <p:titleStyle>
@@ -3289,7 +3289,7 @@
         <p:spPr>
           <a:xfrm>
             <a:off x="827584" y="1944216"/>
-            <a:ext cx="6170984" cy="1273329"/>
+            <a:ext cx="6170984" cy="2740179"/>
           </a:xfrm>
           <a:prstGeom prst="rect">
             <a:avLst/>
@@ -3311,7 +3311,93 @@
               </a:rPr>
               <a:t>목차</a:t>
             </a:r>
-            <a:endParaRPr lang="ko-KR" altLang="en-US"/>
+            <a:endParaRPr lang="ko-KR" altLang="en-US" sz="2400" b="1" i="1">
+              <a:solidFill>
+                <a:srgbClr val="ff0000"/>
+              </a:solidFill>
+              <a:latin typeface="나눔고딕 ExtraBold"/>
+              <a:ea typeface="나눔고딕 ExtraBold"/>
+            </a:endParaRPr>
+          </a:p>
+          <a:p>
+            <a:pPr/>
+            <a:r>
+              <a:rPr lang="ko-KR" altLang="en-US" sz="2400" b="1" i="1">
+                <a:solidFill>
+                  <a:srgbClr val="ff0000"/>
+                </a:solidFill>
+                <a:latin typeface="나눔고딕 ExtraBold"/>
+                <a:ea typeface="나눔고딕 ExtraBold"/>
+              </a:rPr>
+              <a:t> - 소스코드 목차</a:t>
+            </a:r>
+            <a:endParaRPr lang="ko-KR" altLang="en-US" sz="2400" b="1" i="1">
+              <a:solidFill>
+                <a:srgbClr val="ff0000"/>
+              </a:solidFill>
+              <a:latin typeface="나눔고딕 ExtraBold"/>
+              <a:ea typeface="나눔고딕 ExtraBold"/>
+            </a:endParaRPr>
+          </a:p>
+          <a:p>
+            <a:pPr/>
+            <a:r>
+              <a:rPr lang="ko-KR" altLang="en-US" sz="2400" b="1" i="1">
+                <a:solidFill>
+                  <a:srgbClr val="ff0000"/>
+                </a:solidFill>
+                <a:latin typeface="나눔고딕 ExtraBold"/>
+                <a:ea typeface="나눔고딕 ExtraBold"/>
+              </a:rPr>
+              <a:t> - 흐름도</a:t>
+            </a:r>
+            <a:endParaRPr lang="ko-KR" altLang="en-US" sz="2400" b="1" i="1">
+              <a:solidFill>
+                <a:srgbClr val="ff0000"/>
+              </a:solidFill>
+              <a:latin typeface="나눔고딕 ExtraBold"/>
+              <a:ea typeface="나눔고딕 ExtraBold"/>
+            </a:endParaRPr>
+          </a:p>
+          <a:p>
+            <a:pPr/>
+            <a:r>
+              <a:rPr lang="ko-KR" altLang="en-US" sz="2400" b="1" i="1">
+                <a:solidFill>
+                  <a:srgbClr val="ff0000"/>
+                </a:solidFill>
+                <a:latin typeface="나눔고딕 ExtraBold"/>
+                <a:ea typeface="나눔고딕 ExtraBold"/>
+              </a:rPr>
+              <a:t> - 운영체제 지원 사항</a:t>
+            </a:r>
+            <a:endParaRPr lang="ko-KR" altLang="en-US" sz="2400" b="1" i="1">
+              <a:solidFill>
+                <a:srgbClr val="ff0000"/>
+              </a:solidFill>
+              <a:latin typeface="나눔고딕 ExtraBold"/>
+              <a:ea typeface="나눔고딕 ExtraBold"/>
+            </a:endParaRPr>
+          </a:p>
+          <a:p>
+            <a:pPr/>
+            <a:r>
+              <a:rPr lang="ko-KR" altLang="en-US" sz="2400" b="1" i="1">
+                <a:solidFill>
+                  <a:srgbClr val="ff0000"/>
+                </a:solidFill>
+                <a:latin typeface="나눔고딕 ExtraBold"/>
+                <a:ea typeface="나눔고딕 ExtraBold"/>
+              </a:rPr>
+              <a:t> - 컴파일 방법</a:t>
+            </a:r>
+            <a:endParaRPr lang="ko-KR" altLang="en-US" sz="2400" b="1" i="1">
+              <a:solidFill>
+                <a:srgbClr val="ff0000"/>
+              </a:solidFill>
+              <a:latin typeface="나눔고딕 ExtraBold"/>
+              <a:ea typeface="나눔고딕 ExtraBold"/>
+            </a:endParaRPr>
           </a:p>
           <a:p>
             <a:pPr/>

</xml_diff>